<commit_message>
Structure And GUI Adjustment
Modify the structure.
Add new GUI widget called 'choose'
Adjust GUI widget style
</commit_message>
<xml_diff>
--- a/widget/image/1.pptx
+++ b/widget/image/1.pptx
@@ -254,7 +254,7 @@
           <a:p>
             <a:fld id="{56F0679A-AC99-0A42-B74D-391D1CB433B9}" type="datetimeFigureOut">
               <a:rPr kumimoji="1" lang="zh-CN" altLang="en-US" smtClean="0"/>
-              <a:t>2017/8/28</a:t>
+              <a:t>2017/9/9</a:t>
             </a:fld>
             <a:endParaRPr kumimoji="1" lang="zh-CN" altLang="en-US"/>
           </a:p>
@@ -422,7 +422,7 @@
           <a:p>
             <a:fld id="{56F0679A-AC99-0A42-B74D-391D1CB433B9}" type="datetimeFigureOut">
               <a:rPr kumimoji="1" lang="zh-CN" altLang="en-US" smtClean="0"/>
-              <a:t>2017/8/28</a:t>
+              <a:t>2017/9/9</a:t>
             </a:fld>
             <a:endParaRPr kumimoji="1" lang="zh-CN" altLang="en-US"/>
           </a:p>
@@ -600,7 +600,7 @@
           <a:p>
             <a:fld id="{56F0679A-AC99-0A42-B74D-391D1CB433B9}" type="datetimeFigureOut">
               <a:rPr kumimoji="1" lang="zh-CN" altLang="en-US" smtClean="0"/>
-              <a:t>2017/8/28</a:t>
+              <a:t>2017/9/9</a:t>
             </a:fld>
             <a:endParaRPr kumimoji="1" lang="zh-CN" altLang="en-US"/>
           </a:p>
@@ -768,7 +768,7 @@
           <a:p>
             <a:fld id="{56F0679A-AC99-0A42-B74D-391D1CB433B9}" type="datetimeFigureOut">
               <a:rPr kumimoji="1" lang="zh-CN" altLang="en-US" smtClean="0"/>
-              <a:t>2017/8/28</a:t>
+              <a:t>2017/9/9</a:t>
             </a:fld>
             <a:endParaRPr kumimoji="1" lang="zh-CN" altLang="en-US"/>
           </a:p>
@@ -1013,7 +1013,7 @@
           <a:p>
             <a:fld id="{56F0679A-AC99-0A42-B74D-391D1CB433B9}" type="datetimeFigureOut">
               <a:rPr kumimoji="1" lang="zh-CN" altLang="en-US" smtClean="0"/>
-              <a:t>2017/8/28</a:t>
+              <a:t>2017/9/9</a:t>
             </a:fld>
             <a:endParaRPr kumimoji="1" lang="zh-CN" altLang="en-US"/>
           </a:p>
@@ -1242,7 +1242,7 @@
           <a:p>
             <a:fld id="{56F0679A-AC99-0A42-B74D-391D1CB433B9}" type="datetimeFigureOut">
               <a:rPr kumimoji="1" lang="zh-CN" altLang="en-US" smtClean="0"/>
-              <a:t>2017/8/28</a:t>
+              <a:t>2017/9/9</a:t>
             </a:fld>
             <a:endParaRPr kumimoji="1" lang="zh-CN" altLang="en-US"/>
           </a:p>
@@ -1606,7 +1606,7 @@
           <a:p>
             <a:fld id="{56F0679A-AC99-0A42-B74D-391D1CB433B9}" type="datetimeFigureOut">
               <a:rPr kumimoji="1" lang="zh-CN" altLang="en-US" smtClean="0"/>
-              <a:t>2017/8/28</a:t>
+              <a:t>2017/9/9</a:t>
             </a:fld>
             <a:endParaRPr kumimoji="1" lang="zh-CN" altLang="en-US"/>
           </a:p>
@@ -1723,7 +1723,7 @@
           <a:p>
             <a:fld id="{56F0679A-AC99-0A42-B74D-391D1CB433B9}" type="datetimeFigureOut">
               <a:rPr kumimoji="1" lang="zh-CN" altLang="en-US" smtClean="0"/>
-              <a:t>2017/8/28</a:t>
+              <a:t>2017/9/9</a:t>
             </a:fld>
             <a:endParaRPr kumimoji="1" lang="zh-CN" altLang="en-US"/>
           </a:p>
@@ -1818,7 +1818,7 @@
           <a:p>
             <a:fld id="{56F0679A-AC99-0A42-B74D-391D1CB433B9}" type="datetimeFigureOut">
               <a:rPr kumimoji="1" lang="zh-CN" altLang="en-US" smtClean="0"/>
-              <a:t>2017/8/28</a:t>
+              <a:t>2017/9/9</a:t>
             </a:fld>
             <a:endParaRPr kumimoji="1" lang="zh-CN" altLang="en-US"/>
           </a:p>
@@ -2093,7 +2093,7 @@
           <a:p>
             <a:fld id="{56F0679A-AC99-0A42-B74D-391D1CB433B9}" type="datetimeFigureOut">
               <a:rPr kumimoji="1" lang="zh-CN" altLang="en-US" smtClean="0"/>
-              <a:t>2017/8/28</a:t>
+              <a:t>2017/9/9</a:t>
             </a:fld>
             <a:endParaRPr kumimoji="1" lang="zh-CN" altLang="en-US"/>
           </a:p>
@@ -2345,7 +2345,7 @@
           <a:p>
             <a:fld id="{56F0679A-AC99-0A42-B74D-391D1CB433B9}" type="datetimeFigureOut">
               <a:rPr kumimoji="1" lang="zh-CN" altLang="en-US" smtClean="0"/>
-              <a:t>2017/8/28</a:t>
+              <a:t>2017/9/9</a:t>
             </a:fld>
             <a:endParaRPr kumimoji="1" lang="zh-CN" altLang="en-US"/>
           </a:p>
@@ -2556,7 +2556,7 @@
           <a:p>
             <a:fld id="{56F0679A-AC99-0A42-B74D-391D1CB433B9}" type="datetimeFigureOut">
               <a:rPr kumimoji="1" lang="zh-CN" altLang="en-US" smtClean="0"/>
-              <a:t>2017/8/28</a:t>
+              <a:t>2017/9/9</a:t>
             </a:fld>
             <a:endParaRPr kumimoji="1" lang="zh-CN" altLang="en-US"/>
           </a:p>
@@ -2983,7 +2983,7 @@
         </p:blipFill>
         <p:spPr>
           <a:xfrm>
-            <a:off x="2105643" y="476075"/>
+            <a:off x="2105643" y="1492075"/>
             <a:ext cx="7239000" cy="3962400"/>
           </a:xfrm>
           <a:prstGeom prst="rect">
@@ -7289,7 +7289,7 @@
         </p:blipFill>
         <p:spPr>
           <a:xfrm>
-            <a:off x="292055" y="3168319"/>
+            <a:off x="340877" y="3212698"/>
             <a:ext cx="4015195" cy="2662001"/>
           </a:xfrm>
           <a:prstGeom prst="rect">

</xml_diff>